<commit_message>
Added assisted Practice - Day 1
</commit_message>
<xml_diff>
--- a/1. Core Java/Day 1/Slides/1. Modeling Object Behavior with Interfaces/modeling-object-behavior-with-interfaces-slides.pptx
+++ b/1. Core Java/Day 1/Slides/1. Modeling Object Behavior with Interfaces/modeling-object-behavior-with-interfaces-slides.pptx
@@ -5,7 +5,7 @@
     <p:sldMasterId id="2147483648" r:id="rId1"/>
   </p:sldMasterIdLst>
   <p:notesMasterIdLst>
-    <p:notesMasterId r:id="rId40"/>
+    <p:notesMasterId r:id="rId39"/>
   </p:notesMasterIdLst>
   <p:sldIdLst>
     <p:sldId id="256" r:id="rId3"/>
@@ -44,7 +44,6 @@
     <p:sldId id="289" r:id="rId36"/>
     <p:sldId id="290" r:id="rId37"/>
     <p:sldId id="291" r:id="rId38"/>
-    <p:sldId id="292" r:id="rId39"/>
   </p:sldIdLst>
   <p:sldSz cx="18288000" cy="10287000"/>
   <p:notesSz cx="18288000" cy="10287000"/>
@@ -15956,7 +15955,7 @@
         <p:spPr>
           <a:xfrm>
             <a:off x="689863" y="6143370"/>
-            <a:ext cx="16668750" cy="2494915"/>
+            <a:ext cx="16668750" cy="2502535"/>
           </a:xfrm>
           <a:prstGeom prst="rect">
             <a:avLst/>
@@ -16106,74 +16105,44 @@
               </a:tabLst>
             </a:pPr>
             <a:r>
-              <a:rPr sz="3600" b="1" spc="30" dirty="0">
-                <a:solidFill>
-                  <a:srgbClr val="EF5A28"/>
-                </a:solidFill>
-                <a:latin typeface="Trebuchet MS" panose="020B0603020202020204"/>
-                <a:cs typeface="Trebuchet MS" panose="020B0603020202020204"/>
-              </a:rPr>
-              <a:t>the</a:t>
-            </a:r>
-            <a:r>
-              <a:rPr sz="3600" b="1" spc="-135" dirty="0">
-                <a:solidFill>
-                  <a:srgbClr val="EF5A28"/>
-                </a:solidFill>
-                <a:latin typeface="Trebuchet MS" panose="020B0603020202020204"/>
-                <a:cs typeface="Trebuchet MS" panose="020B0603020202020204"/>
-              </a:rPr>
-              <a:t> </a:t>
-            </a:r>
-            <a:r>
-              <a:rPr sz="3600" b="1" spc="25" dirty="0">
-                <a:solidFill>
-                  <a:srgbClr val="EF5A28"/>
-                </a:solidFill>
-                <a:latin typeface="Trebuchet MS" panose="020B0603020202020204"/>
-                <a:cs typeface="Trebuchet MS" panose="020B0603020202020204"/>
-              </a:rPr>
-              <a:t>addition</a:t>
-            </a:r>
-            <a:r>
-              <a:rPr sz="3600" b="1" spc="-114" dirty="0">
-                <a:solidFill>
-                  <a:srgbClr val="EF5A28"/>
-                </a:solidFill>
-                <a:latin typeface="Trebuchet MS" panose="020B0603020202020204"/>
-                <a:cs typeface="Trebuchet MS" panose="020B0603020202020204"/>
-              </a:rPr>
-              <a:t> </a:t>
-            </a:r>
-            <a:r>
-              <a:rPr sz="3600" b="1" spc="25" dirty="0">
-                <a:solidFill>
-                  <a:srgbClr val="EF5A28"/>
-                </a:solidFill>
-                <a:latin typeface="Trebuchet MS" panose="020B0603020202020204"/>
-                <a:cs typeface="Trebuchet MS" panose="020B0603020202020204"/>
-              </a:rPr>
-              <a:t>is</a:t>
-            </a:r>
-            <a:r>
-              <a:rPr sz="3600" b="1" spc="-135" dirty="0">
-                <a:solidFill>
-                  <a:srgbClr val="EF5A28"/>
-                </a:solidFill>
-                <a:latin typeface="Trebuchet MS" panose="020B0603020202020204"/>
-                <a:cs typeface="Trebuchet MS" panose="020B0603020202020204"/>
-              </a:rPr>
-              <a:t> </a:t>
-            </a:r>
-            <a:r>
-              <a:rPr sz="3600" b="1" spc="45" dirty="0">
-                <a:solidFill>
-                  <a:srgbClr val="EF5A28"/>
-                </a:solidFill>
-                <a:latin typeface="Trebuchet MS" panose="020B0603020202020204"/>
-                <a:cs typeface="Trebuchet MS" panose="020B0603020202020204"/>
-              </a:rPr>
-              <a:t>executed</a:t>
+              <a:rPr lang="en-US" sz="3600" b="1" spc="-150" dirty="0">
+                <a:solidFill>
+                  <a:srgbClr val="EF5A28"/>
+                </a:solidFill>
+                <a:latin typeface="Trebuchet MS" panose="020B0603020202020204"/>
+                <a:cs typeface="Trebuchet MS" panose="020B0603020202020204"/>
+              </a:rPr>
+              <a:t>f</a:t>
+            </a:r>
+            <a:r>
+              <a:rPr sz="3600" b="1" spc="-430" dirty="0">
+                <a:solidFill>
+                  <a:srgbClr val="EF5A28"/>
+                </a:solidFill>
+                <a:latin typeface="Trebuchet MS" panose="020B0603020202020204"/>
+                <a:cs typeface="Trebuchet MS" panose="020B0603020202020204"/>
+              </a:rPr>
+              <a:t>1</a:t>
+            </a:r>
+            <a:r>
+              <a:rPr sz="3600" b="1" spc="-140" dirty="0">
+                <a:solidFill>
+                  <a:srgbClr val="EF5A28"/>
+                </a:solidFill>
+                <a:latin typeface="Trebuchet MS" panose="020B0603020202020204"/>
+                <a:cs typeface="Trebuchet MS" panose="020B0603020202020204"/>
+              </a:rPr>
+              <a:t> </a:t>
+            </a:r>
+            <a:r>
+              <a:rPr lang="en-US" sz="3600" b="1" spc="80" dirty="0">
+                <a:solidFill>
+                  <a:srgbClr val="EF5A28"/>
+                </a:solidFill>
+                <a:latin typeface="Trebuchet MS" panose="020B0603020202020204"/>
+                <a:cs typeface="Trebuchet MS" panose="020B0603020202020204"/>
+              </a:rPr>
+              <a:t>is a double by </a:t>
             </a:r>
             <a:r>
               <a:rPr sz="3600" b="1" spc="-125" dirty="0">
@@ -16186,214 +16155,14 @@
               <a:t> </a:t>
             </a:r>
             <a:r>
-              <a:rPr sz="3600" b="1" spc="-25" dirty="0">
-                <a:solidFill>
-                  <a:srgbClr val="EF5A28"/>
-                </a:solidFill>
-                <a:latin typeface="Trebuchet MS" panose="020B0603020202020204"/>
-                <a:cs typeface="Trebuchet MS" panose="020B0603020202020204"/>
-              </a:rPr>
-              <a:t>with</a:t>
-            </a:r>
-            <a:r>
-              <a:rPr sz="3600" b="1" spc="-120" dirty="0">
-                <a:solidFill>
-                  <a:srgbClr val="EF5A28"/>
-                </a:solidFill>
-                <a:latin typeface="Trebuchet MS" panose="020B0603020202020204"/>
-                <a:cs typeface="Trebuchet MS" panose="020B0603020202020204"/>
-              </a:rPr>
-              <a:t> </a:t>
-            </a:r>
-            <a:r>
-              <a:rPr sz="3600" b="1" spc="-145" dirty="0">
-                <a:solidFill>
-                  <a:srgbClr val="EF5A28"/>
-                </a:solidFill>
-                <a:latin typeface="Trebuchet MS" panose="020B0603020202020204"/>
-                <a:cs typeface="Trebuchet MS" panose="020B0603020202020204"/>
-              </a:rPr>
-              <a:t>int,</a:t>
-            </a:r>
-            <a:r>
-              <a:rPr sz="3600" b="1" spc="-125" dirty="0">
-                <a:solidFill>
-                  <a:srgbClr val="EF5A28"/>
-                </a:solidFill>
-                <a:latin typeface="Trebuchet MS" panose="020B0603020202020204"/>
-                <a:cs typeface="Trebuchet MS" panose="020B0603020202020204"/>
-              </a:rPr>
-              <a:t> </a:t>
-            </a:r>
-            <a:r>
-              <a:rPr sz="3600" b="1" spc="160" dirty="0">
-                <a:solidFill>
-                  <a:srgbClr val="EF5A28"/>
-                </a:solidFill>
-                <a:latin typeface="Trebuchet MS" panose="020B0603020202020204"/>
-                <a:cs typeface="Trebuchet MS" panose="020B0603020202020204"/>
-              </a:rPr>
-              <a:t>so</a:t>
-            </a:r>
-            <a:r>
-              <a:rPr sz="3600" b="1" spc="-150" dirty="0">
-                <a:solidFill>
-                  <a:srgbClr val="EF5A28"/>
-                </a:solidFill>
-                <a:latin typeface="Trebuchet MS" panose="020B0603020202020204"/>
-                <a:cs typeface="Trebuchet MS" panose="020B0603020202020204"/>
-              </a:rPr>
-              <a:t> </a:t>
-            </a:r>
-            <a:r>
-              <a:rPr sz="3600" b="1" spc="-430" dirty="0">
-                <a:solidFill>
-                  <a:srgbClr val="EF5A28"/>
-                </a:solidFill>
-                <a:latin typeface="Trebuchet MS" panose="020B0603020202020204"/>
-                <a:cs typeface="Trebuchet MS" panose="020B0603020202020204"/>
-              </a:rPr>
-              <a:t>i1</a:t>
-            </a:r>
-            <a:r>
-              <a:rPr sz="3600" b="1" spc="-140" dirty="0">
-                <a:solidFill>
-                  <a:srgbClr val="EF5A28"/>
-                </a:solidFill>
-                <a:latin typeface="Trebuchet MS" panose="020B0603020202020204"/>
-                <a:cs typeface="Trebuchet MS" panose="020B0603020202020204"/>
-              </a:rPr>
-              <a:t> </a:t>
-            </a:r>
-            <a:r>
-              <a:rPr sz="3600" b="1" spc="80" dirty="0">
-                <a:solidFill>
-                  <a:srgbClr val="EF5A28"/>
-                </a:solidFill>
-                <a:latin typeface="Trebuchet MS" panose="020B0603020202020204"/>
-                <a:cs typeface="Trebuchet MS" panose="020B0603020202020204"/>
-              </a:rPr>
-              <a:t>and</a:t>
-            </a:r>
-            <a:r>
-              <a:rPr sz="3600" b="1" spc="-140" dirty="0">
-                <a:solidFill>
-                  <a:srgbClr val="EF5A28"/>
-                </a:solidFill>
-                <a:latin typeface="Trebuchet MS" panose="020B0603020202020204"/>
-                <a:cs typeface="Trebuchet MS" panose="020B0603020202020204"/>
-              </a:rPr>
-              <a:t> </a:t>
-            </a:r>
-            <a:r>
-              <a:rPr sz="3600" b="1" spc="-75" dirty="0">
-                <a:solidFill>
-                  <a:srgbClr val="EF5A28"/>
-                </a:solidFill>
-                <a:latin typeface="Trebuchet MS" panose="020B0603020202020204"/>
-                <a:cs typeface="Trebuchet MS" panose="020B0603020202020204"/>
-              </a:rPr>
-              <a:t>i2</a:t>
-            </a:r>
-            <a:r>
-              <a:rPr sz="3600" b="1" spc="-140" dirty="0">
-                <a:solidFill>
-                  <a:srgbClr val="EF5A28"/>
-                </a:solidFill>
-                <a:latin typeface="Trebuchet MS" panose="020B0603020202020204"/>
-                <a:cs typeface="Trebuchet MS" panose="020B0603020202020204"/>
-              </a:rPr>
-              <a:t> </a:t>
-            </a:r>
-            <a:r>
-              <a:rPr sz="3600" b="1" spc="-30" dirty="0">
-                <a:solidFill>
-                  <a:srgbClr val="EF5A28"/>
-                </a:solidFill>
-                <a:latin typeface="Trebuchet MS" panose="020B0603020202020204"/>
-                <a:cs typeface="Trebuchet MS" panose="020B0603020202020204"/>
-              </a:rPr>
-              <a:t>are</a:t>
-            </a:r>
-            <a:r>
-              <a:rPr sz="3600" b="1" spc="-145" dirty="0">
-                <a:solidFill>
-                  <a:srgbClr val="EF5A28"/>
-                </a:solidFill>
-                <a:latin typeface="Trebuchet MS" panose="020B0603020202020204"/>
-                <a:cs typeface="Trebuchet MS" panose="020B0603020202020204"/>
-              </a:rPr>
-              <a:t> </a:t>
-            </a:r>
-            <a:r>
-              <a:rPr sz="3600" b="1" spc="-40" dirty="0">
-                <a:solidFill>
-                  <a:srgbClr val="EF5A28"/>
-                </a:solidFill>
-                <a:latin typeface="Trebuchet MS" panose="020B0603020202020204"/>
-                <a:cs typeface="Trebuchet MS" panose="020B0603020202020204"/>
-              </a:rPr>
-              <a:t>first</a:t>
-            </a:r>
-            <a:r>
-              <a:rPr sz="3600" b="1" spc="-130" dirty="0">
-                <a:solidFill>
-                  <a:srgbClr val="EF5A28"/>
-                </a:solidFill>
-                <a:latin typeface="Trebuchet MS" panose="020B0603020202020204"/>
-                <a:cs typeface="Trebuchet MS" panose="020B0603020202020204"/>
-              </a:rPr>
-              <a:t> </a:t>
-            </a:r>
-            <a:r>
-              <a:rPr sz="3600" b="1" spc="50" dirty="0">
-                <a:solidFill>
-                  <a:srgbClr val="EF5A28"/>
-                </a:solidFill>
-                <a:latin typeface="Trebuchet MS" panose="020B0603020202020204"/>
-                <a:cs typeface="Trebuchet MS" panose="020B0603020202020204"/>
-              </a:rPr>
-              <a:t>converted</a:t>
-            </a:r>
-            <a:r>
-              <a:rPr sz="3600" b="1" spc="-130" dirty="0">
-                <a:solidFill>
-                  <a:srgbClr val="EF5A28"/>
-                </a:solidFill>
-                <a:latin typeface="Trebuchet MS" panose="020B0603020202020204"/>
-                <a:cs typeface="Trebuchet MS" panose="020B0603020202020204"/>
-              </a:rPr>
-              <a:t> </a:t>
-            </a:r>
-            <a:r>
-              <a:rPr sz="3600" b="1" spc="35" dirty="0">
-                <a:solidFill>
-                  <a:srgbClr val="EF5A28"/>
-                </a:solidFill>
-                <a:latin typeface="Trebuchet MS" panose="020B0603020202020204"/>
-                <a:cs typeface="Trebuchet MS" panose="020B0603020202020204"/>
-              </a:rPr>
-              <a:t>to</a:t>
-            </a:r>
-            <a:r>
-              <a:rPr sz="3600" b="1" spc="-125" dirty="0">
-                <a:solidFill>
-                  <a:srgbClr val="EF5A28"/>
-                </a:solidFill>
-                <a:latin typeface="Trebuchet MS" panose="020B0603020202020204"/>
-                <a:cs typeface="Trebuchet MS" panose="020B0603020202020204"/>
-              </a:rPr>
-              <a:t> </a:t>
-            </a:r>
-            <a:r>
-              <a:rPr sz="3600" b="1" spc="15" dirty="0">
-                <a:solidFill>
-                  <a:srgbClr val="EF5A28"/>
-                </a:solidFill>
-                <a:latin typeface="Trebuchet MS" panose="020B0603020202020204"/>
-                <a:cs typeface="Trebuchet MS" panose="020B0603020202020204"/>
-              </a:rPr>
-              <a:t>ints</a:t>
+              <a:rPr lang="en-US" sz="3600" b="1" spc="15" dirty="0">
+                <a:solidFill>
+                  <a:srgbClr val="EF5A28"/>
+                </a:solidFill>
+                <a:latin typeface="Trebuchet MS" panose="020B0603020202020204"/>
+                <a:cs typeface="Trebuchet MS" panose="020B0603020202020204"/>
+              </a:rPr>
+              <a:t>default</a:t>
             </a:r>
             <a:endParaRPr sz="3600">
               <a:latin typeface="Trebuchet MS" panose="020B0603020202020204"/>
@@ -16415,244 +16184,14 @@
               </a:tabLst>
             </a:pPr>
             <a:r>
-              <a:rPr sz="3600" b="1" spc="40" dirty="0">
-                <a:solidFill>
-                  <a:srgbClr val="EF5A28"/>
-                </a:solidFill>
-                <a:latin typeface="Trebuchet MS" panose="020B0603020202020204"/>
-                <a:cs typeface="Trebuchet MS" panose="020B0603020202020204"/>
-              </a:rPr>
-              <a:t>then</a:t>
-            </a:r>
-            <a:r>
-              <a:rPr sz="3600" b="1" spc="-120" dirty="0">
-                <a:solidFill>
-                  <a:srgbClr val="EF5A28"/>
-                </a:solidFill>
-                <a:latin typeface="Trebuchet MS" panose="020B0603020202020204"/>
-                <a:cs typeface="Trebuchet MS" panose="020B0603020202020204"/>
-              </a:rPr>
-              <a:t> </a:t>
-            </a:r>
-            <a:r>
-              <a:rPr sz="3600" b="1" spc="30" dirty="0">
-                <a:solidFill>
-                  <a:srgbClr val="EF5A28"/>
-                </a:solidFill>
-                <a:latin typeface="Trebuchet MS" panose="020B0603020202020204"/>
-                <a:cs typeface="Trebuchet MS" panose="020B0603020202020204"/>
-              </a:rPr>
-              <a:t>the</a:t>
-            </a:r>
-            <a:r>
-              <a:rPr sz="3600" b="1" spc="-130" dirty="0">
-                <a:solidFill>
-                  <a:srgbClr val="EF5A28"/>
-                </a:solidFill>
-                <a:latin typeface="Trebuchet MS" panose="020B0603020202020204"/>
-                <a:cs typeface="Trebuchet MS" panose="020B0603020202020204"/>
-              </a:rPr>
-              <a:t> </a:t>
-            </a:r>
-            <a:r>
-              <a:rPr sz="3600" b="1" dirty="0">
-                <a:solidFill>
-                  <a:srgbClr val="EF5A28"/>
-                </a:solidFill>
-                <a:latin typeface="Trebuchet MS" panose="020B0603020202020204"/>
-                <a:cs typeface="Trebuchet MS" panose="020B0603020202020204"/>
-              </a:rPr>
-              <a:t>result</a:t>
-            </a:r>
-            <a:r>
-              <a:rPr sz="3600" b="1" spc="-140" dirty="0">
-                <a:solidFill>
-                  <a:srgbClr val="EF5A28"/>
-                </a:solidFill>
-                <a:latin typeface="Trebuchet MS" panose="020B0603020202020204"/>
-                <a:cs typeface="Trebuchet MS" panose="020B0603020202020204"/>
-              </a:rPr>
-              <a:t> </a:t>
-            </a:r>
-            <a:r>
-              <a:rPr sz="3600" b="1" spc="25" dirty="0">
-                <a:solidFill>
-                  <a:srgbClr val="EF5A28"/>
-                </a:solidFill>
-                <a:latin typeface="Trebuchet MS" panose="020B0603020202020204"/>
-                <a:cs typeface="Trebuchet MS" panose="020B0603020202020204"/>
-              </a:rPr>
-              <a:t>is</a:t>
-            </a:r>
-            <a:r>
-              <a:rPr sz="3600" b="1" spc="-135" dirty="0">
-                <a:solidFill>
-                  <a:srgbClr val="EF5A28"/>
-                </a:solidFill>
-                <a:latin typeface="Trebuchet MS" panose="020B0603020202020204"/>
-                <a:cs typeface="Trebuchet MS" panose="020B0603020202020204"/>
-              </a:rPr>
-              <a:t> </a:t>
-            </a:r>
-            <a:r>
-              <a:rPr sz="3600" b="1" spc="60" dirty="0">
-                <a:solidFill>
-                  <a:srgbClr val="EF5A28"/>
-                </a:solidFill>
-                <a:latin typeface="Trebuchet MS" panose="020B0603020202020204"/>
-                <a:cs typeface="Trebuchet MS" panose="020B0603020202020204"/>
-              </a:rPr>
-              <a:t>also</a:t>
-            </a:r>
-            <a:r>
-              <a:rPr sz="3600" b="1" spc="-140" dirty="0">
-                <a:solidFill>
-                  <a:srgbClr val="EF5A28"/>
-                </a:solidFill>
-                <a:latin typeface="Trebuchet MS" panose="020B0603020202020204"/>
-                <a:cs typeface="Trebuchet MS" panose="020B0603020202020204"/>
-              </a:rPr>
-              <a:t> </a:t>
-            </a:r>
-            <a:r>
-              <a:rPr sz="3600" b="1" spc="55" dirty="0">
-                <a:solidFill>
-                  <a:srgbClr val="EF5A28"/>
-                </a:solidFill>
-                <a:latin typeface="Trebuchet MS" panose="020B0603020202020204"/>
-                <a:cs typeface="Trebuchet MS" panose="020B0603020202020204"/>
-              </a:rPr>
-              <a:t>an</a:t>
-            </a:r>
-            <a:r>
-              <a:rPr sz="3600" b="1" spc="-140" dirty="0">
-                <a:solidFill>
-                  <a:srgbClr val="EF5A28"/>
-                </a:solidFill>
-                <a:latin typeface="Trebuchet MS" panose="020B0603020202020204"/>
-                <a:cs typeface="Trebuchet MS" panose="020B0603020202020204"/>
-              </a:rPr>
-              <a:t> </a:t>
-            </a:r>
-            <a:r>
-              <a:rPr sz="3600" b="1" spc="-145" dirty="0">
-                <a:solidFill>
-                  <a:srgbClr val="EF5A28"/>
-                </a:solidFill>
-                <a:latin typeface="Trebuchet MS" panose="020B0603020202020204"/>
-                <a:cs typeface="Trebuchet MS" panose="020B0603020202020204"/>
-              </a:rPr>
-              <a:t>int,</a:t>
-            </a:r>
-            <a:r>
-              <a:rPr sz="3600" b="1" spc="-125" dirty="0">
-                <a:solidFill>
-                  <a:srgbClr val="EF5A28"/>
-                </a:solidFill>
-                <a:latin typeface="Trebuchet MS" panose="020B0603020202020204"/>
-                <a:cs typeface="Trebuchet MS" panose="020B0603020202020204"/>
-              </a:rPr>
-              <a:t> </a:t>
-            </a:r>
-            <a:r>
-              <a:rPr sz="3600" b="1" spc="15" dirty="0">
-                <a:solidFill>
-                  <a:srgbClr val="EF5A28"/>
-                </a:solidFill>
-                <a:latin typeface="Trebuchet MS" panose="020B0603020202020204"/>
-                <a:cs typeface="Trebuchet MS" panose="020B0603020202020204"/>
-              </a:rPr>
-              <a:t>that</a:t>
-            </a:r>
-            <a:r>
-              <a:rPr sz="3600" b="1" spc="-120" dirty="0">
-                <a:solidFill>
-                  <a:srgbClr val="EF5A28"/>
-                </a:solidFill>
-                <a:latin typeface="Trebuchet MS" panose="020B0603020202020204"/>
-                <a:cs typeface="Trebuchet MS" panose="020B0603020202020204"/>
-              </a:rPr>
-              <a:t> </a:t>
-            </a:r>
-            <a:r>
-              <a:rPr sz="3600" b="1" spc="85" dirty="0">
-                <a:solidFill>
-                  <a:srgbClr val="EF5A28"/>
-                </a:solidFill>
-                <a:latin typeface="Trebuchet MS" panose="020B0603020202020204"/>
-                <a:cs typeface="Trebuchet MS" panose="020B0603020202020204"/>
-              </a:rPr>
-              <a:t>cannot</a:t>
-            </a:r>
-            <a:r>
-              <a:rPr sz="3600" b="1" spc="-135" dirty="0">
-                <a:solidFill>
-                  <a:srgbClr val="EF5A28"/>
-                </a:solidFill>
-                <a:latin typeface="Trebuchet MS" panose="020B0603020202020204"/>
-                <a:cs typeface="Trebuchet MS" panose="020B0603020202020204"/>
-              </a:rPr>
-              <a:t> </a:t>
-            </a:r>
-            <a:r>
-              <a:rPr sz="3600" b="1" spc="85" dirty="0">
-                <a:solidFill>
-                  <a:srgbClr val="EF5A28"/>
-                </a:solidFill>
-                <a:latin typeface="Trebuchet MS" panose="020B0603020202020204"/>
-                <a:cs typeface="Trebuchet MS" panose="020B0603020202020204"/>
-              </a:rPr>
-              <a:t>be</a:t>
-            </a:r>
-            <a:r>
-              <a:rPr sz="3600" b="1" spc="-130" dirty="0">
-                <a:solidFill>
-                  <a:srgbClr val="EF5A28"/>
-                </a:solidFill>
-                <a:latin typeface="Trebuchet MS" panose="020B0603020202020204"/>
-                <a:cs typeface="Trebuchet MS" panose="020B0603020202020204"/>
-              </a:rPr>
-              <a:t> </a:t>
-            </a:r>
-            <a:r>
-              <a:rPr sz="3600" b="1" spc="-25" dirty="0">
-                <a:solidFill>
-                  <a:srgbClr val="EF5A28"/>
-                </a:solidFill>
-                <a:latin typeface="Trebuchet MS" panose="020B0603020202020204"/>
-                <a:cs typeface="Trebuchet MS" panose="020B0603020202020204"/>
-              </a:rPr>
-              <a:t>implicitly</a:t>
-            </a:r>
-            <a:r>
-              <a:rPr sz="3600" b="1" spc="-150" dirty="0">
-                <a:solidFill>
-                  <a:srgbClr val="EF5A28"/>
-                </a:solidFill>
-                <a:latin typeface="Trebuchet MS" panose="020B0603020202020204"/>
-                <a:cs typeface="Trebuchet MS" panose="020B0603020202020204"/>
-              </a:rPr>
-              <a:t> </a:t>
-            </a:r>
-            <a:r>
-              <a:rPr sz="3600" b="1" spc="50" dirty="0">
-                <a:solidFill>
-                  <a:srgbClr val="EF5A28"/>
-                </a:solidFill>
-                <a:latin typeface="Trebuchet MS" panose="020B0603020202020204"/>
-                <a:cs typeface="Trebuchet MS" panose="020B0603020202020204"/>
-              </a:rPr>
-              <a:t>converted</a:t>
-            </a:r>
-            <a:r>
-              <a:rPr sz="3600" b="1" spc="-120" dirty="0">
-                <a:solidFill>
-                  <a:srgbClr val="EF5A28"/>
-                </a:solidFill>
-                <a:latin typeface="Trebuchet MS" panose="020B0603020202020204"/>
-                <a:cs typeface="Trebuchet MS" panose="020B0603020202020204"/>
-              </a:rPr>
-              <a:t> </a:t>
+              <a:rPr lang="en-US" sz="3600" b="1" spc="40" dirty="0">
+                <a:solidFill>
+                  <a:srgbClr val="EF5A28"/>
+                </a:solidFill>
+                <a:latin typeface="Trebuchet MS" panose="020B0603020202020204"/>
+                <a:cs typeface="Trebuchet MS" panose="020B0603020202020204"/>
+              </a:rPr>
+              <a:t>Needs an explici</a:t>
             </a:r>
             <a:r>
               <a:rPr sz="3600" b="1" spc="35" dirty="0">
@@ -16662,49 +16201,22 @@
                 <a:latin typeface="Trebuchet MS" panose="020B0603020202020204"/>
                 <a:cs typeface="Trebuchet MS" panose="020B0603020202020204"/>
               </a:rPr>
-              <a:t>to</a:t>
-            </a:r>
-            <a:r>
-              <a:rPr sz="3600" b="1" spc="-145" dirty="0">
-                <a:solidFill>
-                  <a:srgbClr val="EF5A28"/>
-                </a:solidFill>
-                <a:latin typeface="Trebuchet MS" panose="020B0603020202020204"/>
-                <a:cs typeface="Trebuchet MS" panose="020B0603020202020204"/>
-              </a:rPr>
-              <a:t> </a:t>
-            </a:r>
-            <a:r>
-              <a:rPr sz="3600" b="1" spc="55" dirty="0">
-                <a:solidFill>
-                  <a:srgbClr val="EF5A28"/>
-                </a:solidFill>
-                <a:latin typeface="Trebuchet MS" panose="020B0603020202020204"/>
-                <a:cs typeface="Trebuchet MS" panose="020B0603020202020204"/>
-              </a:rPr>
-              <a:t>a</a:t>
-            </a:r>
-            <a:r>
-              <a:rPr sz="3600" b="1" spc="-140" dirty="0">
-                <a:solidFill>
-                  <a:srgbClr val="EF5A28"/>
-                </a:solidFill>
-                <a:latin typeface="Trebuchet MS" panose="020B0603020202020204"/>
-                <a:cs typeface="Trebuchet MS" panose="020B0603020202020204"/>
-              </a:rPr>
-              <a:t> </a:t>
-            </a:r>
-            <a:r>
-              <a:rPr sz="3600" b="1" spc="35" dirty="0">
-                <a:solidFill>
-                  <a:srgbClr val="EF5A28"/>
-                </a:solidFill>
-                <a:latin typeface="Trebuchet MS" panose="020B0603020202020204"/>
-                <a:cs typeface="Trebuchet MS" panose="020B0603020202020204"/>
-              </a:rPr>
-              <a:t>short</a:t>
-            </a:r>
-            <a:endParaRPr sz="3600">
+              <a:t>t</a:t>
+            </a:r>
+            <a:r>
+              <a:rPr lang="en-US" sz="3600" b="1" spc="35" dirty="0">
+                <a:solidFill>
+                  <a:srgbClr val="EF5A28"/>
+                </a:solidFill>
+                <a:latin typeface="Trebuchet MS" panose="020B0603020202020204"/>
+                <a:cs typeface="Trebuchet MS" panose="020B0603020202020204"/>
+              </a:rPr>
+              <a:t>  cast to assign it to a float variable</a:t>
+            </a:r>
+            <a:endParaRPr lang="en-US" sz="3600" b="1" spc="35" dirty="0">
+              <a:solidFill>
+                <a:srgbClr val="EF5A28"/>
+              </a:solidFill>
               <a:latin typeface="Trebuchet MS" panose="020B0603020202020204"/>
               <a:cs typeface="Trebuchet MS" panose="020B0603020202020204"/>
             </a:endParaRPr>
@@ -18308,295 +17820,6 @@
       <p:sp>
         <p:nvSpPr>
           <p:cNvPr id="8" name="Slide Number Placeholder 7"/>
-          <p:cNvSpPr>
-            <a:spLocks noGrp="1"/>
-          </p:cNvSpPr>
-          <p:nvPr>
-            <p:ph type="sldNum" sz="quarter" idx="7"/>
-          </p:nvPr>
-        </p:nvSpPr>
-        <p:spPr/>
-        <p:txBody>
-          <a:bodyPr/>
-          <a:p>
-            <a:fld id="{B6F15528-21DE-4FAA-801E-634DDDAF4B2B}" type="slidenum">
-              <a:rPr/>
-            </a:fld>
-            <a:endParaRPr/>
-          </a:p>
-        </p:txBody>
-      </p:sp>
-    </p:spTree>
-  </p:cSld>
-  <p:clrMapOvr>
-    <a:masterClrMapping/>
-  </p:clrMapOvr>
-</p:sld>
-</file>
-
-<file path=ppt/slides/slide37.xml><?xml version="1.0" encoding="utf-8"?>
-<p:sld xmlns:a="http://schemas.openxmlformats.org/drawingml/2006/main" xmlns:r="http://schemas.openxmlformats.org/officeDocument/2006/relationships" xmlns:p="http://schemas.openxmlformats.org/presentationml/2006/main" showMasterSp="0">
-  <p:cSld>
-    <p:spTree>
-      <p:nvGrpSpPr>
-        <p:cNvPr id="1" name=""/>
-        <p:cNvGrpSpPr/>
-        <p:nvPr/>
-      </p:nvGrpSpPr>
-      <p:grpSpPr>
-        <a:xfrm>
-          <a:off x="0" y="0"/>
-          <a:ext cx="0" cy="0"/>
-          <a:chOff x="0" y="0"/>
-          <a:chExt cx="0" cy="0"/>
-        </a:xfrm>
-      </p:grpSpPr>
-      <p:pic>
-        <p:nvPicPr>
-          <p:cNvPr id="2" name="object 2"/>
-          <p:cNvPicPr/>
-          <p:nvPr/>
-        </p:nvPicPr>
-        <p:blipFill>
-          <a:blip r:embed="rId1" cstate="print"/>
-          <a:stretch>
-            <a:fillRect/>
-          </a:stretch>
-        </p:blipFill>
-        <p:spPr>
-          <a:xfrm>
-            <a:off x="914400" y="5623940"/>
-            <a:ext cx="16459200" cy="57150"/>
-          </a:xfrm>
-          <a:prstGeom prst="rect">
-            <a:avLst/>
-          </a:prstGeom>
-        </p:spPr>
-      </p:pic>
-      <p:sp>
-        <p:nvSpPr>
-          <p:cNvPr id="3" name="object 3"/>
-          <p:cNvSpPr txBox="1">
-            <a:spLocks noGrp="1"/>
-          </p:cNvSpPr>
-          <p:nvPr>
-            <p:ph type="title"/>
-          </p:nvPr>
-        </p:nvSpPr>
-        <p:spPr>
-          <a:xfrm>
-            <a:off x="1140358" y="3559302"/>
-            <a:ext cx="14366240" cy="1762760"/>
-          </a:xfrm>
-          <a:prstGeom prst="rect">
-            <a:avLst/>
-          </a:prstGeom>
-        </p:spPr>
-        <p:txBody>
-          <a:bodyPr vert="horz" wrap="square" lIns="0" tIns="116205" rIns="0" bIns="0" rtlCol="0">
-            <a:spAutoFit/>
-          </a:bodyPr>
-          <a:lstStyle/>
-          <a:p>
-            <a:pPr marL="12700" marR="5080" indent="34925">
-              <a:lnSpc>
-                <a:spcPts val="6480"/>
-              </a:lnSpc>
-              <a:spcBef>
-                <a:spcPts val="915"/>
-              </a:spcBef>
-            </a:pPr>
-            <a:r>
-              <a:rPr sz="6000" spc="235" dirty="0">
-                <a:solidFill>
-                  <a:srgbClr val="404040"/>
-                </a:solidFill>
-              </a:rPr>
-              <a:t>Up</a:t>
-            </a:r>
-            <a:r>
-              <a:rPr sz="6000" spc="-420" dirty="0">
-                <a:solidFill>
-                  <a:srgbClr val="404040"/>
-                </a:solidFill>
-              </a:rPr>
-              <a:t> </a:t>
-            </a:r>
-            <a:r>
-              <a:rPr sz="6000" spc="240" dirty="0">
-                <a:solidFill>
-                  <a:srgbClr val="404040"/>
-                </a:solidFill>
-              </a:rPr>
-              <a:t>N</a:t>
-            </a:r>
-            <a:r>
-              <a:rPr sz="6000" spc="-254" dirty="0">
-                <a:solidFill>
-                  <a:srgbClr val="404040"/>
-                </a:solidFill>
-              </a:rPr>
-              <a:t>ext:</a:t>
-            </a:r>
-            <a:r>
-              <a:rPr sz="6000" spc="-405" dirty="0">
-                <a:solidFill>
-                  <a:srgbClr val="404040"/>
-                </a:solidFill>
-              </a:rPr>
-              <a:t> </a:t>
-            </a:r>
-            <a:r>
-              <a:rPr sz="6000" spc="220" dirty="0">
-                <a:solidFill>
-                  <a:srgbClr val="404040"/>
-                </a:solidFill>
-              </a:rPr>
-              <a:t>Constru</a:t>
-            </a:r>
-            <a:r>
-              <a:rPr sz="6000" spc="220" dirty="0">
-                <a:solidFill>
-                  <a:srgbClr val="404040"/>
-                </a:solidFill>
-              </a:rPr>
-              <a:t>c</a:t>
-            </a:r>
-            <a:r>
-              <a:rPr sz="6000" spc="85" dirty="0">
-                <a:solidFill>
-                  <a:srgbClr val="404040"/>
-                </a:solidFill>
-              </a:rPr>
-              <a:t>ting</a:t>
-            </a:r>
-            <a:r>
-              <a:rPr sz="6000" spc="-420" dirty="0">
-                <a:solidFill>
-                  <a:srgbClr val="404040"/>
-                </a:solidFill>
-              </a:rPr>
-              <a:t> </a:t>
-            </a:r>
-            <a:r>
-              <a:rPr sz="6000" spc="60" dirty="0">
-                <a:solidFill>
-                  <a:srgbClr val="404040"/>
-                </a:solidFill>
-              </a:rPr>
-              <a:t>an</a:t>
-            </a:r>
-            <a:r>
-              <a:rPr sz="6000" spc="-420" dirty="0">
-                <a:solidFill>
-                  <a:srgbClr val="404040"/>
-                </a:solidFill>
-              </a:rPr>
-              <a:t> </a:t>
-            </a:r>
-            <a:r>
-              <a:rPr sz="6000" spc="20" dirty="0">
-                <a:solidFill>
-                  <a:srgbClr val="404040"/>
-                </a:solidFill>
-              </a:rPr>
-              <a:t>Object,</a:t>
-            </a:r>
-            <a:r>
-              <a:rPr sz="6000" spc="-400" dirty="0">
-                <a:solidFill>
-                  <a:srgbClr val="404040"/>
-                </a:solidFill>
-              </a:rPr>
-              <a:t> </a:t>
-            </a:r>
-            <a:r>
-              <a:rPr sz="6000" spc="114" dirty="0">
-                <a:solidFill>
-                  <a:srgbClr val="404040"/>
-                </a:solidFill>
-              </a:rPr>
-              <a:t>Calling</a:t>
-            </a:r>
-            <a:r>
-              <a:rPr sz="6000" spc="-420" dirty="0">
-                <a:solidFill>
-                  <a:srgbClr val="404040"/>
-                </a:solidFill>
-              </a:rPr>
-              <a:t> </a:t>
-            </a:r>
-            <a:r>
-              <a:rPr sz="6000" dirty="0">
-                <a:solidFill>
-                  <a:srgbClr val="404040"/>
-                </a:solidFill>
-              </a:rPr>
-              <a:t>a  </a:t>
-            </a:r>
-            <a:r>
-              <a:rPr sz="6000" spc="175" dirty="0">
-                <a:solidFill>
-                  <a:srgbClr val="404040"/>
-                </a:solidFill>
-              </a:rPr>
-              <a:t>Constructor</a:t>
-            </a:r>
-            <a:r>
-              <a:rPr sz="6000" spc="-425" dirty="0">
-                <a:solidFill>
-                  <a:srgbClr val="404040"/>
-                </a:solidFill>
-              </a:rPr>
-              <a:t> </a:t>
-            </a:r>
-            <a:r>
-              <a:rPr sz="6000" spc="10" dirty="0">
-                <a:solidFill>
-                  <a:srgbClr val="404040"/>
-                </a:solidFill>
-              </a:rPr>
-              <a:t>from</a:t>
-            </a:r>
-            <a:r>
-              <a:rPr sz="6000" spc="-425" dirty="0">
-                <a:solidFill>
-                  <a:srgbClr val="404040"/>
-                </a:solidFill>
-              </a:rPr>
-              <a:t> </a:t>
-            </a:r>
-            <a:r>
-              <a:rPr sz="6000" spc="5" dirty="0">
-                <a:solidFill>
-                  <a:srgbClr val="404040"/>
-                </a:solidFill>
-              </a:rPr>
-              <a:t>a</a:t>
-            </a:r>
-            <a:r>
-              <a:rPr sz="6000" spc="-425" dirty="0">
-                <a:solidFill>
-                  <a:srgbClr val="404040"/>
-                </a:solidFill>
-              </a:rPr>
-              <a:t> </a:t>
-            </a:r>
-            <a:r>
-              <a:rPr sz="6000" spc="175" dirty="0">
-                <a:solidFill>
-                  <a:srgbClr val="404040"/>
-                </a:solidFill>
-              </a:rPr>
-              <a:t>Constructor</a:t>
-            </a:r>
-            <a:endParaRPr sz="6000"/>
-          </a:p>
-        </p:txBody>
-      </p:sp>
-      <p:sp>
-        <p:nvSpPr>
-          <p:cNvPr id="4" name="Slide Number Placeholder 3"/>
           <p:cNvSpPr>
             <a:spLocks noGrp="1"/>
           </p:cNvSpPr>

</xml_diff>